<commit_message>
adding project plan to proposal
</commit_message>
<xml_diff>
--- a/Deliverables/ProjectPlan.pptx
+++ b/Deliverables/ProjectPlan.pptx
@@ -107,6 +107,11 @@
       </a:defRPr>
     </a:lvl9pPr>
   </p:defaultTextStyle>
+  <p:extLst>
+    <p:ext uri="{EFAFB233-063F-42B5-8137-9DF3F51BA10A}">
+      <p15:sldGuideLst xmlns:p15="http://schemas.microsoft.com/office/powerpoint/2012/main"/>
+    </p:ext>
+  </p:extLst>
 </p:presentation>
 </file>
 
@@ -192,7 +197,7 @@
           <a:p>
             <a:fld id="{B8B807C3-56BF-EB4D-A8F7-15F18DEFE101}" type="datetimeFigureOut">
               <a:rPr lang="en-US" smtClean="0"/>
-              <a:t>11/16/17</a:t>
+              <a:t>11/16/2017</a:t>
             </a:fld>
             <a:endParaRPr lang="en-US"/>
           </a:p>
@@ -591,7 +596,7 @@
           <a:p>
             <a:fld id="{94DE8812-7672-F044-974F-D86395754CA8}" type="datetimeFigureOut">
               <a:rPr lang="en-US" smtClean="0"/>
-              <a:t>11/16/17</a:t>
+              <a:t>11/16/2017</a:t>
             </a:fld>
             <a:endParaRPr lang="en-US"/>
           </a:p>
@@ -761,7 +766,7 @@
           <a:p>
             <a:fld id="{94DE8812-7672-F044-974F-D86395754CA8}" type="datetimeFigureOut">
               <a:rPr lang="en-US" smtClean="0"/>
-              <a:t>11/16/17</a:t>
+              <a:t>11/16/2017</a:t>
             </a:fld>
             <a:endParaRPr lang="en-US"/>
           </a:p>
@@ -941,7 +946,7 @@
           <a:p>
             <a:fld id="{94DE8812-7672-F044-974F-D86395754CA8}" type="datetimeFigureOut">
               <a:rPr lang="en-US" smtClean="0"/>
-              <a:t>11/16/17</a:t>
+              <a:t>11/16/2017</a:t>
             </a:fld>
             <a:endParaRPr lang="en-US"/>
           </a:p>
@@ -1111,7 +1116,7 @@
           <a:p>
             <a:fld id="{94DE8812-7672-F044-974F-D86395754CA8}" type="datetimeFigureOut">
               <a:rPr lang="en-US" smtClean="0"/>
-              <a:t>11/16/17</a:t>
+              <a:t>11/16/2017</a:t>
             </a:fld>
             <a:endParaRPr lang="en-US"/>
           </a:p>
@@ -1357,7 +1362,7 @@
           <a:p>
             <a:fld id="{94DE8812-7672-F044-974F-D86395754CA8}" type="datetimeFigureOut">
               <a:rPr lang="en-US" smtClean="0"/>
-              <a:t>11/16/17</a:t>
+              <a:t>11/16/2017</a:t>
             </a:fld>
             <a:endParaRPr lang="en-US"/>
           </a:p>
@@ -1589,7 +1594,7 @@
           <a:p>
             <a:fld id="{94DE8812-7672-F044-974F-D86395754CA8}" type="datetimeFigureOut">
               <a:rPr lang="en-US" smtClean="0"/>
-              <a:t>11/16/17</a:t>
+              <a:t>11/16/2017</a:t>
             </a:fld>
             <a:endParaRPr lang="en-US"/>
           </a:p>
@@ -1956,7 +1961,7 @@
           <a:p>
             <a:fld id="{94DE8812-7672-F044-974F-D86395754CA8}" type="datetimeFigureOut">
               <a:rPr lang="en-US" smtClean="0"/>
-              <a:t>11/16/17</a:t>
+              <a:t>11/16/2017</a:t>
             </a:fld>
             <a:endParaRPr lang="en-US"/>
           </a:p>
@@ -2074,7 +2079,7 @@
           <a:p>
             <a:fld id="{94DE8812-7672-F044-974F-D86395754CA8}" type="datetimeFigureOut">
               <a:rPr lang="en-US" smtClean="0"/>
-              <a:t>11/16/17</a:t>
+              <a:t>11/16/2017</a:t>
             </a:fld>
             <a:endParaRPr lang="en-US"/>
           </a:p>
@@ -2169,7 +2174,7 @@
           <a:p>
             <a:fld id="{94DE8812-7672-F044-974F-D86395754CA8}" type="datetimeFigureOut">
               <a:rPr lang="en-US" smtClean="0"/>
-              <a:t>11/16/17</a:t>
+              <a:t>11/16/2017</a:t>
             </a:fld>
             <a:endParaRPr lang="en-US"/>
           </a:p>
@@ -2446,7 +2451,7 @@
           <a:p>
             <a:fld id="{94DE8812-7672-F044-974F-D86395754CA8}" type="datetimeFigureOut">
               <a:rPr lang="en-US" smtClean="0"/>
-              <a:t>11/16/17</a:t>
+              <a:t>11/16/2017</a:t>
             </a:fld>
             <a:endParaRPr lang="en-US"/>
           </a:p>
@@ -2699,7 +2704,7 @@
           <a:p>
             <a:fld id="{94DE8812-7672-F044-974F-D86395754CA8}" type="datetimeFigureOut">
               <a:rPr lang="en-US" smtClean="0"/>
-              <a:t>11/16/17</a:t>
+              <a:t>11/16/2017</a:t>
             </a:fld>
             <a:endParaRPr lang="en-US"/>
           </a:p>
@@ -2912,7 +2917,7 @@
           <a:p>
             <a:fld id="{94DE8812-7672-F044-974F-D86395754CA8}" type="datetimeFigureOut">
               <a:rPr lang="en-US" smtClean="0"/>
-              <a:t>11/16/17</a:t>
+              <a:t>11/16/2017</a:t>
             </a:fld>
             <a:endParaRPr lang="en-US"/>
           </a:p>
@@ -3349,14 +3354,14 @@
       </p:pic>
       <p:sp>
         <p:nvSpPr>
-          <p:cNvPr id="12" name="TextBox 11"/>
+          <p:cNvPr id="16" name="TextBox 15"/>
           <p:cNvSpPr txBox="1"/>
           <p:nvPr/>
         </p:nvSpPr>
         <p:spPr>
           <a:xfrm>
-            <a:off x="3571875" y="800100"/>
-            <a:ext cx="4503220" cy="369332"/>
+            <a:off x="464842" y="5289482"/>
+            <a:ext cx="1609736" cy="261610"/>
           </a:xfrm>
           <a:prstGeom prst="rect">
             <a:avLst/>
@@ -3370,23 +3375,27 @@
           <a:lstStyle/>
           <a:p>
             <a:r>
-              <a:rPr lang="en-US" dirty="0" smtClean="0"/>
-              <a:t>Research existing video processing techniques</a:t>
-            </a:r>
-            <a:endParaRPr lang="en-US" dirty="0"/>
-          </a:p>
-        </p:txBody>
-      </p:sp>
-      <p:sp>
-        <p:nvSpPr>
-          <p:cNvPr id="13" name="TextBox 12"/>
+              <a:rPr lang="en-US" sz="1100" b="1" dirty="0" smtClean="0"/>
+              <a:t>Evaluation</a:t>
+            </a:r>
+            <a:r>
+              <a:rPr lang="en-US" sz="1100" dirty="0" smtClean="0"/>
+              <a:t> (01/04/2018)</a:t>
+            </a:r>
+            <a:endParaRPr lang="en-US" sz="1100" dirty="0"/>
+          </a:p>
+        </p:txBody>
+      </p:sp>
+      <p:sp>
+        <p:nvSpPr>
+          <p:cNvPr id="17" name="TextBox 16"/>
           <p:cNvSpPr txBox="1"/>
           <p:nvPr/>
         </p:nvSpPr>
         <p:spPr>
           <a:xfrm>
-            <a:off x="3671888" y="1343025"/>
-            <a:ext cx="4940968" cy="369332"/>
+            <a:off x="640430" y="205349"/>
+            <a:ext cx="1815094" cy="261610"/>
           </a:xfrm>
           <a:prstGeom prst="rect">
             <a:avLst/>
@@ -3394,29 +3403,37 @@
           <a:noFill/>
         </p:spPr>
         <p:txBody>
-          <a:bodyPr wrap="none" rtlCol="0">
+          <a:bodyPr wrap="square" rtlCol="0">
             <a:spAutoFit/>
           </a:bodyPr>
           <a:lstStyle/>
           <a:p>
             <a:r>
-              <a:rPr lang="en-US" dirty="0" smtClean="0"/>
-              <a:t>Research machine learning techniques and models</a:t>
-            </a:r>
-            <a:endParaRPr lang="en-US" dirty="0"/>
-          </a:p>
-        </p:txBody>
-      </p:sp>
-      <p:sp>
-        <p:nvSpPr>
-          <p:cNvPr id="14" name="TextBox 13"/>
+              <a:rPr lang="en-US" sz="1100" b="1" i="1" dirty="0" smtClean="0"/>
+              <a:t>Feasibility </a:t>
+            </a:r>
+            <a:r>
+              <a:rPr lang="en-US" sz="1100" i="1" dirty="0" smtClean="0"/>
+              <a:t>(01/10/2017)</a:t>
+            </a:r>
+            <a:r>
+              <a:rPr lang="en-US" sz="1100" b="1" i="1" dirty="0" smtClean="0"/>
+              <a:t> </a:t>
+            </a:r>
+            <a:endParaRPr lang="en-US" sz="1100" b="1" i="1" dirty="0"/>
+          </a:p>
+        </p:txBody>
+      </p:sp>
+      <p:sp>
+        <p:nvSpPr>
+          <p:cNvPr id="18" name="TextBox 17"/>
           <p:cNvSpPr txBox="1"/>
           <p:nvPr/>
         </p:nvSpPr>
         <p:spPr>
           <a:xfrm>
-            <a:off x="3671888" y="2328863"/>
-            <a:ext cx="3735959" cy="369332"/>
+            <a:off x="637348" y="1126318"/>
+            <a:ext cx="3496470" cy="261610"/>
           </a:xfrm>
           <a:prstGeom prst="rect">
             <a:avLst/>
@@ -3430,23 +3447,31 @@
           <a:lstStyle/>
           <a:p>
             <a:r>
-              <a:rPr lang="en-US" dirty="0" smtClean="0"/>
-              <a:t>Develop testing scenarios and metrics</a:t>
-            </a:r>
-            <a:endParaRPr lang="en-US" dirty="0"/>
-          </a:p>
-        </p:txBody>
-      </p:sp>
-      <p:sp>
-        <p:nvSpPr>
-          <p:cNvPr id="15" name="TextBox 14"/>
+              <a:rPr lang="en-US" sz="1100" b="1" i="1" dirty="0" smtClean="0"/>
+              <a:t>Discovery</a:t>
+            </a:r>
+            <a:r>
+              <a:rPr lang="en-US" sz="1100" i="1" dirty="0" smtClean="0"/>
+              <a:t> (26/01/2018) </a:t>
+            </a:r>
+            <a:r>
+              <a:rPr lang="en-US" sz="1100" i="1" u="sng" dirty="0" smtClean="0"/>
+              <a:t>* time allowed for January Exams</a:t>
+            </a:r>
+            <a:endParaRPr lang="en-US" sz="1100" i="1" u="sng" dirty="0"/>
+          </a:p>
+        </p:txBody>
+      </p:sp>
+      <p:sp>
+        <p:nvSpPr>
+          <p:cNvPr id="19" name="TextBox 18"/>
           <p:cNvSpPr txBox="1"/>
           <p:nvPr/>
         </p:nvSpPr>
         <p:spPr>
           <a:xfrm>
-            <a:off x="3671888" y="3270750"/>
-            <a:ext cx="3083088" cy="369332"/>
+            <a:off x="637348" y="2328863"/>
+            <a:ext cx="1499128" cy="261610"/>
           </a:xfrm>
           <a:prstGeom prst="rect">
             <a:avLst/>
@@ -3460,23 +3485,27 @@
           <a:lstStyle/>
           <a:p>
             <a:r>
-              <a:rPr lang="en-US" dirty="0" smtClean="0"/>
-              <a:t>Develop micro-service solution</a:t>
-            </a:r>
-            <a:endParaRPr lang="en-US" dirty="0"/>
-          </a:p>
-        </p:txBody>
-      </p:sp>
-      <p:sp>
-        <p:nvSpPr>
-          <p:cNvPr id="16" name="TextBox 15"/>
+              <a:rPr lang="en-US" sz="1100" b="1" i="1" dirty="0" smtClean="0"/>
+              <a:t>Delivery</a:t>
+            </a:r>
+            <a:r>
+              <a:rPr lang="en-US" sz="1100" i="1" dirty="0" smtClean="0"/>
+              <a:t> (16/02/2018)</a:t>
+            </a:r>
+            <a:endParaRPr lang="en-US" sz="1100" i="1" dirty="0"/>
+          </a:p>
+        </p:txBody>
+      </p:sp>
+      <p:sp>
+        <p:nvSpPr>
+          <p:cNvPr id="20" name="TextBox 19"/>
           <p:cNvSpPr txBox="1"/>
           <p:nvPr/>
         </p:nvSpPr>
         <p:spPr>
           <a:xfrm>
-            <a:off x="3800475" y="4114800"/>
-            <a:ext cx="3256661" cy="369332"/>
+            <a:off x="637348" y="6398767"/>
+            <a:ext cx="2228495" cy="261610"/>
           </a:xfrm>
           <a:prstGeom prst="rect">
             <a:avLst/>
@@ -3490,23 +3519,27 @@
           <a:lstStyle/>
           <a:p>
             <a:r>
-              <a:rPr lang="en-US" dirty="0" smtClean="0"/>
-              <a:t>Begin Evaluation of final solution</a:t>
-            </a:r>
-            <a:endParaRPr lang="en-US" dirty="0"/>
-          </a:p>
-        </p:txBody>
-      </p:sp>
-      <p:sp>
-        <p:nvSpPr>
-          <p:cNvPr id="17" name="TextBox 16"/>
+              <a:rPr lang="en-US" sz="1100" b="1" i="1" dirty="0" smtClean="0"/>
+              <a:t>Demonstration Event </a:t>
+            </a:r>
+            <a:r>
+              <a:rPr lang="en-US" sz="1100" i="1" dirty="0" smtClean="0"/>
+              <a:t>(03/05/2018)</a:t>
+            </a:r>
+            <a:endParaRPr lang="en-US" sz="1100" i="1" dirty="0"/>
+          </a:p>
+        </p:txBody>
+      </p:sp>
+      <p:sp>
+        <p:nvSpPr>
+          <p:cNvPr id="2" name="TextBox 1"/>
           <p:cNvSpPr txBox="1"/>
           <p:nvPr/>
         </p:nvSpPr>
         <p:spPr>
           <a:xfrm>
-            <a:off x="728662" y="157162"/>
-            <a:ext cx="1115755" cy="369332"/>
+            <a:off x="888415" y="411599"/>
+            <a:ext cx="4568879" cy="938719"/>
           </a:xfrm>
           <a:prstGeom prst="rect">
             <a:avLst/>
@@ -3519,24 +3552,123 @@
           </a:bodyPr>
           <a:lstStyle/>
           <a:p>
-            <a:r>
-              <a:rPr lang="en-US" i="1" smtClean="0"/>
-              <a:t>Feasibility</a:t>
-            </a:r>
-            <a:endParaRPr lang="en-US" i="1" dirty="0"/>
-          </a:p>
-        </p:txBody>
-      </p:sp>
-      <p:sp>
-        <p:nvSpPr>
-          <p:cNvPr id="18" name="TextBox 17"/>
+            <a:pPr marL="171450" indent="-171450">
+              <a:buClr>
+                <a:srgbClr val="FF0000"/>
+              </a:buClr>
+              <a:buFont typeface="Arial" panose="020B0604020202020204" pitchFamily="34" charset="0"/>
+              <a:buChar char="•"/>
+            </a:pPr>
+            <a:r>
+              <a:rPr lang="en-GB" sz="1100" dirty="0" smtClean="0">
+                <a:solidFill>
+                  <a:srgbClr val="FF0000"/>
+                </a:solidFill>
+              </a:rPr>
+              <a:t>(5) </a:t>
+            </a:r>
+            <a:r>
+              <a:rPr lang="en-GB" sz="1100" dirty="0" smtClean="0"/>
+              <a:t>Investigate video processing techniques for facial and object detection</a:t>
+            </a:r>
+          </a:p>
+          <a:p>
+            <a:pPr marL="171450" indent="-171450">
+              <a:buClr>
+                <a:srgbClr val="FF0000"/>
+              </a:buClr>
+              <a:buFont typeface="Arial" panose="020B0604020202020204" pitchFamily="34" charset="0"/>
+              <a:buChar char="•"/>
+            </a:pPr>
+            <a:r>
+              <a:rPr lang="en-GB" sz="1100" dirty="0" smtClean="0">
+                <a:solidFill>
+                  <a:srgbClr val="FF0000"/>
+                </a:solidFill>
+              </a:rPr>
+              <a:t>(2) </a:t>
+            </a:r>
+            <a:r>
+              <a:rPr lang="en-GB" sz="1100" dirty="0" smtClean="0"/>
+              <a:t>Investigate </a:t>
+            </a:r>
+            <a:r>
+              <a:rPr lang="en-GB" sz="1100" dirty="0"/>
+              <a:t>best available software for video processing</a:t>
+            </a:r>
+          </a:p>
+          <a:p>
+            <a:pPr marL="171450" indent="-171450">
+              <a:buClr>
+                <a:srgbClr val="FF0000"/>
+              </a:buClr>
+              <a:buFont typeface="Arial" panose="020B0604020202020204" pitchFamily="34" charset="0"/>
+              <a:buChar char="•"/>
+            </a:pPr>
+            <a:r>
+              <a:rPr lang="en-GB" sz="1100" dirty="0" smtClean="0">
+                <a:solidFill>
+                  <a:srgbClr val="FF0000"/>
+                </a:solidFill>
+              </a:rPr>
+              <a:t>(7) </a:t>
+            </a:r>
+            <a:r>
+              <a:rPr lang="en-GB" sz="1100" dirty="0" smtClean="0"/>
+              <a:t>Investigate </a:t>
+            </a:r>
+            <a:r>
+              <a:rPr lang="en-GB" sz="1100" dirty="0"/>
+              <a:t>unsupervised learning models for anomaly detection</a:t>
+            </a:r>
+          </a:p>
+          <a:p>
+            <a:pPr marL="171450" indent="-171450">
+              <a:buClr>
+                <a:srgbClr val="FF0000"/>
+              </a:buClr>
+              <a:buFont typeface="Arial" panose="020B0604020202020204" pitchFamily="34" charset="0"/>
+              <a:buChar char="•"/>
+            </a:pPr>
+            <a:r>
+              <a:rPr lang="en-GB" sz="1100" dirty="0" smtClean="0">
+                <a:solidFill>
+                  <a:srgbClr val="FF0000"/>
+                </a:solidFill>
+              </a:rPr>
+              <a:t>(3) </a:t>
+            </a:r>
+            <a:r>
+              <a:rPr lang="en-GB" sz="1100" dirty="0" smtClean="0"/>
+              <a:t>Investigate </a:t>
+            </a:r>
+            <a:r>
+              <a:rPr lang="en-GB" sz="1100" dirty="0"/>
+              <a:t>best software for providing machine learning models</a:t>
+            </a:r>
+          </a:p>
+          <a:p>
+            <a:pPr marL="171450" indent="-171450">
+              <a:buClr>
+                <a:srgbClr val="FF0000"/>
+              </a:buClr>
+              <a:buFont typeface="Arial" panose="020B0604020202020204" pitchFamily="34" charset="0"/>
+              <a:buChar char="•"/>
+            </a:pPr>
+            <a:endParaRPr lang="en-GB" sz="1100" dirty="0"/>
+          </a:p>
+        </p:txBody>
+      </p:sp>
+      <p:sp>
+        <p:nvSpPr>
+          <p:cNvPr id="6" name="TextBox 5"/>
           <p:cNvSpPr txBox="1"/>
           <p:nvPr/>
         </p:nvSpPr>
         <p:spPr>
           <a:xfrm>
-            <a:off x="728661" y="1040844"/>
-            <a:ext cx="1115755" cy="369332"/>
+            <a:off x="888415" y="1391595"/>
+            <a:ext cx="5596404" cy="1107996"/>
           </a:xfrm>
           <a:prstGeom prst="rect">
             <a:avLst/>
@@ -3549,24 +3681,179 @@
           </a:bodyPr>
           <a:lstStyle/>
           <a:p>
-            <a:r>
-              <a:rPr lang="en-US" i="1" smtClean="0"/>
-              <a:t>Feasibility</a:t>
-            </a:r>
-            <a:endParaRPr lang="en-US" i="1" dirty="0"/>
-          </a:p>
-        </p:txBody>
-      </p:sp>
-      <p:sp>
-        <p:nvSpPr>
-          <p:cNvPr id="19" name="TextBox 18"/>
+            <a:pPr marL="171450" indent="-171450">
+              <a:buClr>
+                <a:schemeClr val="accent4">
+                  <a:lumMod val="75000"/>
+                </a:schemeClr>
+              </a:buClr>
+              <a:buFont typeface="Arial" panose="020B0604020202020204" pitchFamily="34" charset="0"/>
+              <a:buChar char="•"/>
+            </a:pPr>
+            <a:r>
+              <a:rPr lang="en-GB" sz="1100" dirty="0" smtClean="0">
+                <a:solidFill>
+                  <a:schemeClr val="accent4">
+                    <a:lumMod val="75000"/>
+                  </a:schemeClr>
+                </a:solidFill>
+              </a:rPr>
+              <a:t>(5) </a:t>
+            </a:r>
+            <a:r>
+              <a:rPr lang="en-GB" sz="1100" dirty="0" smtClean="0"/>
+              <a:t>Develop a video processing PoC with investigated software</a:t>
+            </a:r>
+          </a:p>
+          <a:p>
+            <a:pPr marL="171450" indent="-171450">
+              <a:buClr>
+                <a:schemeClr val="accent4">
+                  <a:lumMod val="75000"/>
+                </a:schemeClr>
+              </a:buClr>
+              <a:buFont typeface="Arial" panose="020B0604020202020204" pitchFamily="34" charset="0"/>
+              <a:buChar char="•"/>
+            </a:pPr>
+            <a:r>
+              <a:rPr lang="en-GB" sz="1100" dirty="0" smtClean="0">
+                <a:solidFill>
+                  <a:schemeClr val="accent4">
+                    <a:lumMod val="75000"/>
+                  </a:schemeClr>
+                </a:solidFill>
+              </a:rPr>
+              <a:t>(5) </a:t>
+            </a:r>
+            <a:r>
+              <a:rPr lang="en-GB" sz="1100" dirty="0" smtClean="0"/>
+              <a:t>Develop </a:t>
+            </a:r>
+            <a:r>
+              <a:rPr lang="en-GB" sz="1100" dirty="0"/>
+              <a:t>a machine learning PoC with investigated software</a:t>
+            </a:r>
+          </a:p>
+          <a:p>
+            <a:pPr marL="171450" indent="-171450">
+              <a:buClr>
+                <a:schemeClr val="accent4">
+                  <a:lumMod val="75000"/>
+                </a:schemeClr>
+              </a:buClr>
+              <a:buFont typeface="Arial" panose="020B0604020202020204" pitchFamily="34" charset="0"/>
+              <a:buChar char="•"/>
+            </a:pPr>
+            <a:r>
+              <a:rPr lang="en-GB" sz="1100" dirty="0" smtClean="0">
+                <a:solidFill>
+                  <a:schemeClr val="accent4">
+                    <a:lumMod val="75000"/>
+                  </a:schemeClr>
+                </a:solidFill>
+              </a:rPr>
+              <a:t>(3) </a:t>
+            </a:r>
+            <a:r>
+              <a:rPr lang="en-GB" sz="1100" dirty="0" smtClean="0"/>
+              <a:t>Develop </a:t>
+            </a:r>
+            <a:r>
+              <a:rPr lang="en-GB" sz="1100" dirty="0"/>
+              <a:t>a messaging service layer for service communication PoC</a:t>
+            </a:r>
+          </a:p>
+          <a:p>
+            <a:pPr marL="171450" indent="-171450">
+              <a:buClr>
+                <a:schemeClr val="accent4">
+                  <a:lumMod val="75000"/>
+                </a:schemeClr>
+              </a:buClr>
+              <a:buFont typeface="Arial" panose="020B0604020202020204" pitchFamily="34" charset="0"/>
+              <a:buChar char="•"/>
+            </a:pPr>
+            <a:r>
+              <a:rPr lang="en-GB" sz="1100" dirty="0" smtClean="0">
+                <a:solidFill>
+                  <a:schemeClr val="accent4">
+                    <a:lumMod val="75000"/>
+                  </a:schemeClr>
+                </a:solidFill>
+              </a:rPr>
+              <a:t>(2) </a:t>
+            </a:r>
+            <a:r>
+              <a:rPr lang="en-GB" sz="1100" dirty="0" smtClean="0"/>
+              <a:t>Develop </a:t>
+            </a:r>
+            <a:r>
+              <a:rPr lang="en-GB" sz="1100" dirty="0"/>
+              <a:t>a web user interface </a:t>
+            </a:r>
+            <a:r>
+              <a:rPr lang="en-GB" sz="1100" dirty="0" smtClean="0"/>
+              <a:t>PoC</a:t>
+            </a:r>
+          </a:p>
+          <a:p>
+            <a:pPr marL="171450" indent="-171450">
+              <a:buClr>
+                <a:schemeClr val="accent4">
+                  <a:lumMod val="75000"/>
+                </a:schemeClr>
+              </a:buClr>
+              <a:buFont typeface="Arial" panose="020B0604020202020204" pitchFamily="34" charset="0"/>
+              <a:buChar char="•"/>
+            </a:pPr>
+            <a:r>
+              <a:rPr lang="en-GB" sz="1100" dirty="0" smtClean="0">
+                <a:solidFill>
+                  <a:schemeClr val="accent4">
+                    <a:lumMod val="75000"/>
+                  </a:schemeClr>
+                </a:solidFill>
+              </a:rPr>
+              <a:t>(3) </a:t>
+            </a:r>
+            <a:r>
+              <a:rPr lang="en-GB" sz="1100" dirty="0" smtClean="0"/>
+              <a:t>Develop </a:t>
+            </a:r>
+            <a:r>
+              <a:rPr lang="en-GB" sz="1100" dirty="0"/>
+              <a:t>Continuous Integration infrastructure and production infrastructure </a:t>
+            </a:r>
+            <a:r>
+              <a:rPr lang="en-GB" sz="1100" dirty="0" smtClean="0"/>
+              <a:t>capabilities</a:t>
+            </a:r>
+            <a:endParaRPr lang="en-GB" sz="1100" dirty="0"/>
+          </a:p>
+          <a:p>
+            <a:pPr marL="171450" indent="-171450">
+              <a:buClr>
+                <a:schemeClr val="accent4">
+                  <a:lumMod val="75000"/>
+                </a:schemeClr>
+              </a:buClr>
+              <a:buFont typeface="Arial" panose="020B0604020202020204" pitchFamily="34" charset="0"/>
+              <a:buChar char="•"/>
+            </a:pPr>
+            <a:endParaRPr lang="en-GB" sz="1100" dirty="0"/>
+          </a:p>
+        </p:txBody>
+      </p:sp>
+      <p:sp>
+        <p:nvSpPr>
+          <p:cNvPr id="23" name="TextBox 22"/>
           <p:cNvSpPr txBox="1"/>
           <p:nvPr/>
         </p:nvSpPr>
         <p:spPr>
           <a:xfrm>
-            <a:off x="728660" y="2165629"/>
-            <a:ext cx="1115755" cy="369332"/>
+            <a:off x="888415" y="2669230"/>
+            <a:ext cx="5179623" cy="1615827"/>
           </a:xfrm>
           <a:prstGeom prst="rect">
             <a:avLst/>
@@ -3579,24 +3866,244 @@
           </a:bodyPr>
           <a:lstStyle/>
           <a:p>
-            <a:r>
-              <a:rPr lang="en-US" i="1" smtClean="0"/>
-              <a:t>Feasibility</a:t>
-            </a:r>
-            <a:endParaRPr lang="en-US" i="1" dirty="0"/>
-          </a:p>
-        </p:txBody>
-      </p:sp>
-      <p:sp>
-        <p:nvSpPr>
-          <p:cNvPr id="20" name="TextBox 19"/>
+            <a:pPr marL="171450" indent="-171450">
+              <a:buClr>
+                <a:schemeClr val="accent6">
+                  <a:lumMod val="75000"/>
+                </a:schemeClr>
+              </a:buClr>
+              <a:buFont typeface="Wingdings" panose="05000000000000000000" pitchFamily="2" charset="2"/>
+              <a:buChar char="§"/>
+            </a:pPr>
+            <a:r>
+              <a:rPr lang="en-GB" sz="1100" dirty="0" smtClean="0">
+                <a:solidFill>
+                  <a:schemeClr val="accent6">
+                    <a:lumMod val="75000"/>
+                  </a:schemeClr>
+                </a:solidFill>
+              </a:rPr>
+              <a:t>(3) </a:t>
+            </a:r>
+            <a:r>
+              <a:rPr lang="en-GB" sz="1100" dirty="0" smtClean="0"/>
+              <a:t>Requirement: Build tests cases to deem success of system</a:t>
+            </a:r>
+          </a:p>
+          <a:p>
+            <a:pPr marL="171450" indent="-171450">
+              <a:buClr>
+                <a:schemeClr val="accent6">
+                  <a:lumMod val="75000"/>
+                </a:schemeClr>
+              </a:buClr>
+              <a:buFont typeface="Wingdings" panose="05000000000000000000" pitchFamily="2" charset="2"/>
+              <a:buChar char="§"/>
+            </a:pPr>
+            <a:r>
+              <a:rPr lang="en-GB" sz="1100" dirty="0" smtClean="0">
+                <a:solidFill>
+                  <a:schemeClr val="accent6">
+                    <a:lumMod val="75000"/>
+                  </a:schemeClr>
+                </a:solidFill>
+              </a:rPr>
+              <a:t>(4) </a:t>
+            </a:r>
+            <a:r>
+              <a:rPr lang="en-GB" sz="1100" dirty="0" smtClean="0"/>
+              <a:t>Feature</a:t>
+            </a:r>
+            <a:r>
+              <a:rPr lang="en-GB" sz="1100" dirty="0"/>
+              <a:t>: Extrapolate necessary and useful features from video processing </a:t>
+            </a:r>
+            <a:r>
+              <a:rPr lang="en-GB" sz="1100" dirty="0" smtClean="0"/>
+              <a:t>service</a:t>
+            </a:r>
+          </a:p>
+          <a:p>
+            <a:pPr marL="171450" indent="-171450">
+              <a:buClr>
+                <a:schemeClr val="accent6">
+                  <a:lumMod val="75000"/>
+                </a:schemeClr>
+              </a:buClr>
+              <a:buFont typeface="Wingdings" panose="05000000000000000000" pitchFamily="2" charset="2"/>
+              <a:buChar char="§"/>
+            </a:pPr>
+            <a:r>
+              <a:rPr lang="en-GB" sz="1100" dirty="0" smtClean="0">
+                <a:solidFill>
+                  <a:schemeClr val="accent6">
+                    <a:lumMod val="75000"/>
+                  </a:schemeClr>
+                </a:solidFill>
+              </a:rPr>
+              <a:t>(3) </a:t>
+            </a:r>
+            <a:r>
+              <a:rPr lang="en-GB" sz="1100" dirty="0" smtClean="0"/>
+              <a:t>Feature</a:t>
+            </a:r>
+            <a:r>
+              <a:rPr lang="en-GB" sz="1100" dirty="0"/>
+              <a:t>: Configure known users for facial recognition in video processing service</a:t>
+            </a:r>
+          </a:p>
+          <a:p>
+            <a:pPr marL="171450" indent="-171450">
+              <a:buClr>
+                <a:schemeClr val="accent6">
+                  <a:lumMod val="75000"/>
+                </a:schemeClr>
+              </a:buClr>
+              <a:buFont typeface="Wingdings" panose="05000000000000000000" pitchFamily="2" charset="2"/>
+              <a:buChar char="§"/>
+            </a:pPr>
+            <a:r>
+              <a:rPr lang="en-GB" sz="1100" dirty="0" smtClean="0">
+                <a:solidFill>
+                  <a:schemeClr val="accent6">
+                    <a:lumMod val="75000"/>
+                  </a:schemeClr>
+                </a:solidFill>
+              </a:rPr>
+              <a:t>(7) </a:t>
+            </a:r>
+            <a:r>
+              <a:rPr lang="en-GB" sz="1100" dirty="0" smtClean="0"/>
+              <a:t>Feature</a:t>
+            </a:r>
+            <a:r>
+              <a:rPr lang="en-GB" sz="1100" dirty="0"/>
+              <a:t>: Machine learning model combination exploring for best results</a:t>
+            </a:r>
+          </a:p>
+          <a:p>
+            <a:pPr marL="171450" indent="-171450">
+              <a:buClr>
+                <a:schemeClr val="accent6">
+                  <a:lumMod val="75000"/>
+                </a:schemeClr>
+              </a:buClr>
+              <a:buFont typeface="Wingdings" panose="05000000000000000000" pitchFamily="2" charset="2"/>
+              <a:buChar char="§"/>
+            </a:pPr>
+            <a:r>
+              <a:rPr lang="en-GB" sz="1100" dirty="0" smtClean="0">
+                <a:solidFill>
+                  <a:schemeClr val="accent6">
+                    <a:lumMod val="75000"/>
+                  </a:schemeClr>
+                </a:solidFill>
+              </a:rPr>
+              <a:t>(3) </a:t>
+            </a:r>
+            <a:r>
+              <a:rPr lang="en-GB" sz="1100" dirty="0" smtClean="0"/>
+              <a:t>Feature</a:t>
+            </a:r>
+            <a:r>
+              <a:rPr lang="en-GB" sz="1100" dirty="0"/>
+              <a:t>: Build and tune machine learning models for behaviour classification</a:t>
+            </a:r>
+          </a:p>
+          <a:p>
+            <a:pPr marL="171450" indent="-171450">
+              <a:buClr>
+                <a:schemeClr val="accent6">
+                  <a:lumMod val="75000"/>
+                </a:schemeClr>
+              </a:buClr>
+              <a:buFont typeface="Wingdings" panose="05000000000000000000" pitchFamily="2" charset="2"/>
+              <a:buChar char="§"/>
+            </a:pPr>
+            <a:r>
+              <a:rPr lang="en-GB" sz="1100" dirty="0" smtClean="0">
+                <a:solidFill>
+                  <a:schemeClr val="accent6">
+                    <a:lumMod val="75000"/>
+                  </a:schemeClr>
+                </a:solidFill>
+              </a:rPr>
+              <a:t>(5) </a:t>
+            </a:r>
+            <a:r>
+              <a:rPr lang="en-GB" sz="1100" dirty="0" smtClean="0"/>
+              <a:t>Feature</a:t>
+            </a:r>
+            <a:r>
+              <a:rPr lang="en-GB" sz="1100" dirty="0"/>
+              <a:t>: Display recorded event statistics in the web user interface </a:t>
+            </a:r>
+          </a:p>
+          <a:p>
+            <a:pPr marL="171450" indent="-171450">
+              <a:buClr>
+                <a:schemeClr val="accent6">
+                  <a:lumMod val="75000"/>
+                </a:schemeClr>
+              </a:buClr>
+              <a:buFont typeface="Wingdings" panose="05000000000000000000" pitchFamily="2" charset="2"/>
+              <a:buChar char="§"/>
+            </a:pPr>
+            <a:r>
+              <a:rPr lang="en-GB" sz="1100" dirty="0" smtClean="0">
+                <a:solidFill>
+                  <a:schemeClr val="accent6">
+                    <a:lumMod val="75000"/>
+                  </a:schemeClr>
+                </a:solidFill>
+              </a:rPr>
+              <a:t>(7) </a:t>
+            </a:r>
+            <a:r>
+              <a:rPr lang="en-GB" sz="1100" dirty="0" smtClean="0"/>
+              <a:t>Requirement</a:t>
+            </a:r>
+            <a:r>
+              <a:rPr lang="en-GB" sz="1100" dirty="0"/>
+              <a:t>: Develop load testing capability to allow system benchmarking</a:t>
+            </a:r>
+          </a:p>
+          <a:p>
+            <a:pPr marL="171450" indent="-171450">
+              <a:buClr>
+                <a:schemeClr val="accent6">
+                  <a:lumMod val="75000"/>
+                </a:schemeClr>
+              </a:buClr>
+              <a:buFont typeface="Wingdings" panose="05000000000000000000" pitchFamily="2" charset="2"/>
+              <a:buChar char="§"/>
+            </a:pPr>
+            <a:endParaRPr lang="en-GB" sz="1100" dirty="0"/>
+          </a:p>
+          <a:p>
+            <a:pPr marL="171450" indent="-171450">
+              <a:buClr>
+                <a:schemeClr val="accent6">
+                  <a:lumMod val="75000"/>
+                </a:schemeClr>
+              </a:buClr>
+              <a:buFont typeface="Wingdings" panose="05000000000000000000" pitchFamily="2" charset="2"/>
+              <a:buChar char="§"/>
+            </a:pPr>
+            <a:endParaRPr lang="en-GB" sz="1100" dirty="0"/>
+          </a:p>
+        </p:txBody>
+      </p:sp>
+      <p:sp>
+        <p:nvSpPr>
+          <p:cNvPr id="26" name="TextBox 25"/>
           <p:cNvSpPr txBox="1"/>
           <p:nvPr/>
         </p:nvSpPr>
         <p:spPr>
           <a:xfrm>
-            <a:off x="649413" y="6267450"/>
-            <a:ext cx="1115755" cy="369332"/>
+            <a:off x="887490" y="4625425"/>
+            <a:ext cx="4913525" cy="769441"/>
           </a:xfrm>
           <a:prstGeom prst="rect">
             <a:avLst/>
@@ -3609,11 +4116,342 @@
           </a:bodyPr>
           <a:lstStyle/>
           <a:p>
-            <a:r>
-              <a:rPr lang="en-US" i="1" smtClean="0"/>
-              <a:t>Feasibility</a:t>
-            </a:r>
-            <a:endParaRPr lang="en-US" i="1" dirty="0"/>
+            <a:pPr marL="171450" indent="-171450">
+              <a:buClr>
+                <a:schemeClr val="accent6">
+                  <a:lumMod val="75000"/>
+                </a:schemeClr>
+              </a:buClr>
+              <a:buFont typeface="Wingdings" panose="05000000000000000000" pitchFamily="2" charset="2"/>
+              <a:buChar char="v"/>
+            </a:pPr>
+            <a:r>
+              <a:rPr lang="en-GB" sz="1100" dirty="0" smtClean="0">
+                <a:solidFill>
+                  <a:schemeClr val="accent6">
+                    <a:lumMod val="75000"/>
+                  </a:schemeClr>
+                </a:solidFill>
+              </a:rPr>
+              <a:t>(2) </a:t>
+            </a:r>
+            <a:r>
+              <a:rPr lang="en-GB" sz="1100" dirty="0" smtClean="0"/>
+              <a:t>Feature: Allow multiple cameras to simultaneously stream</a:t>
+            </a:r>
+          </a:p>
+          <a:p>
+            <a:pPr marL="171450" indent="-171450">
+              <a:buClr>
+                <a:schemeClr val="accent6">
+                  <a:lumMod val="75000"/>
+                </a:schemeClr>
+              </a:buClr>
+              <a:buFont typeface="Wingdings" panose="05000000000000000000" pitchFamily="2" charset="2"/>
+              <a:buChar char="v"/>
+            </a:pPr>
+            <a:r>
+              <a:rPr lang="en-GB" sz="1100" dirty="0" smtClean="0">
+                <a:solidFill>
+                  <a:schemeClr val="accent6">
+                    <a:lumMod val="75000"/>
+                  </a:schemeClr>
+                </a:solidFill>
+              </a:rPr>
+              <a:t>(9) </a:t>
+            </a:r>
+            <a:r>
+              <a:rPr lang="en-GB" sz="1100" dirty="0" smtClean="0"/>
+              <a:t>Feature</a:t>
+            </a:r>
+            <a:r>
+              <a:rPr lang="en-GB" sz="1100" dirty="0"/>
+              <a:t>: Allow communication to camera to store video if anomaly detected</a:t>
+            </a:r>
+          </a:p>
+          <a:p>
+            <a:pPr marL="171450" indent="-171450">
+              <a:buClr>
+                <a:schemeClr val="accent6">
+                  <a:lumMod val="75000"/>
+                </a:schemeClr>
+              </a:buClr>
+              <a:buFont typeface="Wingdings" panose="05000000000000000000" pitchFamily="2" charset="2"/>
+              <a:buChar char="v"/>
+            </a:pPr>
+            <a:r>
+              <a:rPr lang="en-GB" sz="1100" dirty="0" smtClean="0">
+                <a:solidFill>
+                  <a:schemeClr val="accent6">
+                    <a:lumMod val="75000"/>
+                  </a:schemeClr>
+                </a:solidFill>
+              </a:rPr>
+              <a:t>(4) </a:t>
+            </a:r>
+            <a:r>
+              <a:rPr lang="en-GB" sz="1100" dirty="0" smtClean="0"/>
+              <a:t>Feature</a:t>
+            </a:r>
+            <a:r>
+              <a:rPr lang="en-GB" sz="1100" dirty="0"/>
+              <a:t>: Alert sending on anomaly detection</a:t>
+            </a:r>
+          </a:p>
+          <a:p>
+            <a:pPr marL="171450" indent="-171450">
+              <a:buClr>
+                <a:schemeClr val="accent6">
+                  <a:lumMod val="75000"/>
+                </a:schemeClr>
+              </a:buClr>
+              <a:buFont typeface="Wingdings" panose="05000000000000000000" pitchFamily="2" charset="2"/>
+              <a:buChar char="v"/>
+            </a:pPr>
+            <a:endParaRPr lang="en-GB" sz="1100" dirty="0"/>
+          </a:p>
+        </p:txBody>
+      </p:sp>
+      <p:sp>
+        <p:nvSpPr>
+          <p:cNvPr id="31" name="TextBox 30"/>
+          <p:cNvSpPr txBox="1"/>
+          <p:nvPr/>
+        </p:nvSpPr>
+        <p:spPr>
+          <a:xfrm>
+            <a:off x="631478" y="4363815"/>
+            <a:ext cx="2457724" cy="261610"/>
+          </a:xfrm>
+          <a:prstGeom prst="rect">
+            <a:avLst/>
+          </a:prstGeom>
+          <a:noFill/>
+        </p:spPr>
+        <p:txBody>
+          <a:bodyPr wrap="none" rtlCol="0">
+            <a:spAutoFit/>
+          </a:bodyPr>
+          <a:lstStyle/>
+          <a:p>
+            <a:r>
+              <a:rPr lang="en-US" sz="1100" b="1" dirty="0" smtClean="0"/>
+              <a:t>Minimum Viable Product</a:t>
+            </a:r>
+            <a:r>
+              <a:rPr lang="en-US" sz="1100" dirty="0" smtClean="0"/>
+              <a:t> (23/03/2018)</a:t>
+            </a:r>
+            <a:endParaRPr lang="en-US" sz="1100" dirty="0"/>
+          </a:p>
+        </p:txBody>
+      </p:sp>
+      <p:sp>
+        <p:nvSpPr>
+          <p:cNvPr id="35" name="TextBox 34"/>
+          <p:cNvSpPr txBox="1"/>
+          <p:nvPr/>
+        </p:nvSpPr>
+        <p:spPr>
+          <a:xfrm>
+            <a:off x="887490" y="5494082"/>
+            <a:ext cx="4865434" cy="938719"/>
+          </a:xfrm>
+          <a:prstGeom prst="rect">
+            <a:avLst/>
+          </a:prstGeom>
+          <a:noFill/>
+        </p:spPr>
+        <p:txBody>
+          <a:bodyPr wrap="none" rtlCol="0">
+            <a:spAutoFit/>
+          </a:bodyPr>
+          <a:lstStyle/>
+          <a:p>
+            <a:pPr marL="171450" indent="-171450">
+              <a:buClr>
+                <a:schemeClr val="accent6">
+                  <a:lumMod val="75000"/>
+                </a:schemeClr>
+              </a:buClr>
+              <a:buFont typeface="Wingdings" panose="05000000000000000000" pitchFamily="2" charset="2"/>
+              <a:buChar char="Ø"/>
+            </a:pPr>
+            <a:r>
+              <a:rPr lang="en-GB" sz="1100" dirty="0" smtClean="0">
+                <a:solidFill>
+                  <a:schemeClr val="accent6">
+                    <a:lumMod val="75000"/>
+                  </a:schemeClr>
+                </a:solidFill>
+              </a:rPr>
+              <a:t>(3) </a:t>
+            </a:r>
+            <a:r>
+              <a:rPr lang="en-GB" sz="1100" dirty="0" smtClean="0"/>
+              <a:t>Use Case: Run system against test cases collecting meta data</a:t>
+            </a:r>
+          </a:p>
+          <a:p>
+            <a:pPr marL="171450" indent="-171450">
+              <a:buClr>
+                <a:schemeClr val="accent6">
+                  <a:lumMod val="75000"/>
+                </a:schemeClr>
+              </a:buClr>
+              <a:buFont typeface="Wingdings" panose="05000000000000000000" pitchFamily="2" charset="2"/>
+              <a:buChar char="Ø"/>
+            </a:pPr>
+            <a:r>
+              <a:rPr lang="en-GB" sz="1100" dirty="0" smtClean="0">
+                <a:solidFill>
+                  <a:schemeClr val="accent6">
+                    <a:lumMod val="75000"/>
+                  </a:schemeClr>
+                </a:solidFill>
+              </a:rPr>
+              <a:t>(5) </a:t>
+            </a:r>
+            <a:r>
+              <a:rPr lang="en-GB" sz="1100" dirty="0" smtClean="0"/>
+              <a:t>Evaluate</a:t>
+            </a:r>
+            <a:r>
+              <a:rPr lang="en-GB" sz="1100" dirty="0"/>
+              <a:t>: Accuracy of system analysing final machine learning </a:t>
+            </a:r>
+            <a:r>
+              <a:rPr lang="en-GB" sz="1100" dirty="0" smtClean="0"/>
+              <a:t>configuration</a:t>
+            </a:r>
+          </a:p>
+          <a:p>
+            <a:pPr marL="171450" indent="-171450">
+              <a:buClr>
+                <a:schemeClr val="accent6">
+                  <a:lumMod val="75000"/>
+                </a:schemeClr>
+              </a:buClr>
+              <a:buFont typeface="Wingdings" panose="05000000000000000000" pitchFamily="2" charset="2"/>
+              <a:buChar char="Ø"/>
+            </a:pPr>
+            <a:r>
+              <a:rPr lang="en-GB" sz="1100" dirty="0" smtClean="0">
+                <a:solidFill>
+                  <a:schemeClr val="accent6">
+                    <a:lumMod val="75000"/>
+                  </a:schemeClr>
+                </a:solidFill>
+              </a:rPr>
+              <a:t>(4) </a:t>
+            </a:r>
+            <a:r>
+              <a:rPr lang="en-GB" sz="1100" dirty="0" smtClean="0"/>
+              <a:t>Evaluate</a:t>
+            </a:r>
+            <a:r>
+              <a:rPr lang="en-GB" sz="1100" dirty="0"/>
+              <a:t>: Performance of system in processing video and events</a:t>
+            </a:r>
+          </a:p>
+          <a:p>
+            <a:pPr marL="171450" indent="-171450">
+              <a:buClr>
+                <a:schemeClr val="accent6">
+                  <a:lumMod val="75000"/>
+                </a:schemeClr>
+              </a:buClr>
+              <a:buFont typeface="Wingdings" panose="05000000000000000000" pitchFamily="2" charset="2"/>
+              <a:buChar char="Ø"/>
+            </a:pPr>
+            <a:r>
+              <a:rPr lang="en-GB" sz="1100" dirty="0" smtClean="0">
+                <a:solidFill>
+                  <a:schemeClr val="accent6">
+                    <a:lumMod val="75000"/>
+                  </a:schemeClr>
+                </a:solidFill>
+              </a:rPr>
+              <a:t>(4) </a:t>
+            </a:r>
+            <a:r>
+              <a:rPr lang="en-GB" sz="1100" dirty="0" smtClean="0"/>
+              <a:t>Evaluate</a:t>
+            </a:r>
+            <a:r>
+              <a:rPr lang="en-GB" sz="1100" dirty="0"/>
+              <a:t>: Storage required to provide anomaly detection service </a:t>
+            </a:r>
+          </a:p>
+          <a:p>
+            <a:pPr marL="171450" indent="-171450">
+              <a:buClr>
+                <a:schemeClr val="accent6">
+                  <a:lumMod val="75000"/>
+                </a:schemeClr>
+              </a:buClr>
+              <a:buFont typeface="Wingdings" panose="05000000000000000000" pitchFamily="2" charset="2"/>
+              <a:buChar char="Ø"/>
+            </a:pPr>
+            <a:r>
+              <a:rPr lang="en-GB" sz="1100" dirty="0" smtClean="0">
+                <a:solidFill>
+                  <a:schemeClr val="accent6">
+                    <a:lumMod val="75000"/>
+                  </a:schemeClr>
+                </a:solidFill>
+              </a:rPr>
+              <a:t>(5) </a:t>
+            </a:r>
+            <a:r>
+              <a:rPr lang="en-GB" sz="1100" dirty="0" smtClean="0"/>
+              <a:t>Requirement</a:t>
+            </a:r>
+            <a:r>
+              <a:rPr lang="en-GB" sz="1100" dirty="0"/>
+              <a:t>: Project </a:t>
+            </a:r>
+            <a:r>
+              <a:rPr lang="en-GB" sz="1100" dirty="0" smtClean="0"/>
+              <a:t>Poster </a:t>
+            </a:r>
+            <a:endParaRPr lang="en-GB" sz="1100" dirty="0"/>
+          </a:p>
+        </p:txBody>
+      </p:sp>
+      <p:sp>
+        <p:nvSpPr>
+          <p:cNvPr id="37" name="TextBox 36"/>
+          <p:cNvSpPr txBox="1"/>
+          <p:nvPr/>
+        </p:nvSpPr>
+        <p:spPr>
+          <a:xfrm>
+            <a:off x="9153637" y="329961"/>
+            <a:ext cx="2778978" cy="600164"/>
+          </a:xfrm>
+          <a:prstGeom prst="rect">
+            <a:avLst/>
+          </a:prstGeom>
+          <a:noFill/>
+        </p:spPr>
+        <p:txBody>
+          <a:bodyPr wrap="square" rtlCol="0">
+            <a:spAutoFit/>
+          </a:bodyPr>
+          <a:lstStyle/>
+          <a:p>
+            <a:r>
+              <a:rPr lang="en-GB" sz="1100" dirty="0" smtClean="0"/>
+              <a:t>Key: </a:t>
+            </a:r>
+          </a:p>
+          <a:p>
+            <a:r>
+              <a:rPr lang="en-GB" sz="1100" dirty="0" smtClean="0"/>
+              <a:t>(Number) : The complexity points estimated for the task</a:t>
+            </a:r>
+            <a:endParaRPr lang="en-GB" sz="1100" dirty="0"/>
           </a:p>
         </p:txBody>
       </p:sp>

</xml_diff>

<commit_message>
proposal changes from review
</commit_message>
<xml_diff>
--- a/Deliverables/ProjectPlan.pptx
+++ b/Deliverables/ProjectPlan.pptx
@@ -197,7 +197,7 @@
           <a:p>
             <a:fld id="{B8B807C3-56BF-EB4D-A8F7-15F18DEFE101}" type="datetimeFigureOut">
               <a:rPr lang="en-US" smtClean="0"/>
-              <a:t>11/16/17</a:t>
+              <a:t>11/20/2017</a:t>
             </a:fld>
             <a:endParaRPr lang="en-US"/>
           </a:p>
@@ -596,7 +596,7 @@
           <a:p>
             <a:fld id="{94DE8812-7672-F044-974F-D86395754CA8}" type="datetimeFigureOut">
               <a:rPr lang="en-US" smtClean="0"/>
-              <a:t>11/16/17</a:t>
+              <a:t>11/20/2017</a:t>
             </a:fld>
             <a:endParaRPr lang="en-US"/>
           </a:p>
@@ -766,7 +766,7 @@
           <a:p>
             <a:fld id="{94DE8812-7672-F044-974F-D86395754CA8}" type="datetimeFigureOut">
               <a:rPr lang="en-US" smtClean="0"/>
-              <a:t>11/16/17</a:t>
+              <a:t>11/20/2017</a:t>
             </a:fld>
             <a:endParaRPr lang="en-US"/>
           </a:p>
@@ -946,7 +946,7 @@
           <a:p>
             <a:fld id="{94DE8812-7672-F044-974F-D86395754CA8}" type="datetimeFigureOut">
               <a:rPr lang="en-US" smtClean="0"/>
-              <a:t>11/16/17</a:t>
+              <a:t>11/20/2017</a:t>
             </a:fld>
             <a:endParaRPr lang="en-US"/>
           </a:p>
@@ -1116,7 +1116,7 @@
           <a:p>
             <a:fld id="{94DE8812-7672-F044-974F-D86395754CA8}" type="datetimeFigureOut">
               <a:rPr lang="en-US" smtClean="0"/>
-              <a:t>11/16/17</a:t>
+              <a:t>11/20/2017</a:t>
             </a:fld>
             <a:endParaRPr lang="en-US"/>
           </a:p>
@@ -1362,7 +1362,7 @@
           <a:p>
             <a:fld id="{94DE8812-7672-F044-974F-D86395754CA8}" type="datetimeFigureOut">
               <a:rPr lang="en-US" smtClean="0"/>
-              <a:t>11/16/17</a:t>
+              <a:t>11/20/2017</a:t>
             </a:fld>
             <a:endParaRPr lang="en-US"/>
           </a:p>
@@ -1594,7 +1594,7 @@
           <a:p>
             <a:fld id="{94DE8812-7672-F044-974F-D86395754CA8}" type="datetimeFigureOut">
               <a:rPr lang="en-US" smtClean="0"/>
-              <a:t>11/16/17</a:t>
+              <a:t>11/20/2017</a:t>
             </a:fld>
             <a:endParaRPr lang="en-US"/>
           </a:p>
@@ -1961,7 +1961,7 @@
           <a:p>
             <a:fld id="{94DE8812-7672-F044-974F-D86395754CA8}" type="datetimeFigureOut">
               <a:rPr lang="en-US" smtClean="0"/>
-              <a:t>11/16/17</a:t>
+              <a:t>11/20/2017</a:t>
             </a:fld>
             <a:endParaRPr lang="en-US"/>
           </a:p>
@@ -2079,7 +2079,7 @@
           <a:p>
             <a:fld id="{94DE8812-7672-F044-974F-D86395754CA8}" type="datetimeFigureOut">
               <a:rPr lang="en-US" smtClean="0"/>
-              <a:t>11/16/17</a:t>
+              <a:t>11/20/2017</a:t>
             </a:fld>
             <a:endParaRPr lang="en-US"/>
           </a:p>
@@ -2174,7 +2174,7 @@
           <a:p>
             <a:fld id="{94DE8812-7672-F044-974F-D86395754CA8}" type="datetimeFigureOut">
               <a:rPr lang="en-US" smtClean="0"/>
-              <a:t>11/16/17</a:t>
+              <a:t>11/20/2017</a:t>
             </a:fld>
             <a:endParaRPr lang="en-US"/>
           </a:p>
@@ -2451,7 +2451,7 @@
           <a:p>
             <a:fld id="{94DE8812-7672-F044-974F-D86395754CA8}" type="datetimeFigureOut">
               <a:rPr lang="en-US" smtClean="0"/>
-              <a:t>11/16/17</a:t>
+              <a:t>11/20/2017</a:t>
             </a:fld>
             <a:endParaRPr lang="en-US"/>
           </a:p>
@@ -2704,7 +2704,7 @@
           <a:p>
             <a:fld id="{94DE8812-7672-F044-974F-D86395754CA8}" type="datetimeFigureOut">
               <a:rPr lang="en-US" smtClean="0"/>
-              <a:t>11/16/17</a:t>
+              <a:t>11/20/2017</a:t>
             </a:fld>
             <a:endParaRPr lang="en-US"/>
           </a:p>
@@ -2917,7 +2917,7 @@
           <a:p>
             <a:fld id="{94DE8812-7672-F044-974F-D86395754CA8}" type="datetimeFigureOut">
               <a:rPr lang="en-US" smtClean="0"/>
-              <a:t>11/16/17</a:t>
+              <a:t>11/20/2017</a:t>
             </a:fld>
             <a:endParaRPr lang="en-US"/>
           </a:p>
@@ -3565,15 +3565,7 @@
                   <a:srgbClr val="FF0000"/>
                 </a:solidFill>
               </a:rPr>
-              <a:t>(2/5</a:t>
-            </a:r>
-            <a:r>
-              <a:rPr lang="en-GB" sz="1100" dirty="0" smtClean="0">
-                <a:solidFill>
-                  <a:srgbClr val="FF0000"/>
-                </a:solidFill>
-              </a:rPr>
-              <a:t>) </a:t>
+              <a:t>(2/5) </a:t>
             </a:r>
             <a:r>
               <a:rPr lang="en-GB" sz="1100" dirty="0" smtClean="0"/>
@@ -3594,15 +3586,7 @@
                   <a:srgbClr val="FF0000"/>
                 </a:solidFill>
               </a:rPr>
-              <a:t>(2/2</a:t>
-            </a:r>
-            <a:r>
-              <a:rPr lang="en-GB" sz="1100" dirty="0" smtClean="0">
-                <a:solidFill>
-                  <a:srgbClr val="FF0000"/>
-                </a:solidFill>
-              </a:rPr>
-              <a:t>) </a:t>
+              <a:t>(2/2) </a:t>
             </a:r>
             <a:r>
               <a:rPr lang="en-GB" sz="1100" dirty="0" smtClean="0"/>
@@ -3627,15 +3611,7 @@
                   <a:srgbClr val="FF0000"/>
                 </a:solidFill>
               </a:rPr>
-              <a:t>(1/7</a:t>
-            </a:r>
-            <a:r>
-              <a:rPr lang="en-GB" sz="1100" dirty="0" smtClean="0">
-                <a:solidFill>
-                  <a:srgbClr val="FF0000"/>
-                </a:solidFill>
-              </a:rPr>
-              <a:t>) </a:t>
+              <a:t>(1/7) </a:t>
             </a:r>
             <a:r>
               <a:rPr lang="en-GB" sz="1100" dirty="0" smtClean="0"/>
@@ -3919,7 +3895,19 @@
             </a:r>
             <a:r>
               <a:rPr lang="en-GB" sz="1100" dirty="0" smtClean="0"/>
-              <a:t>Requirement: Build tests cases to deem success of system</a:t>
+              <a:t>Requirement: </a:t>
+            </a:r>
+            <a:r>
+              <a:rPr lang="en-GB" sz="1100" smtClean="0"/>
+              <a:t>Build </a:t>
+            </a:r>
+            <a:r>
+              <a:rPr lang="en-GB" sz="1100" smtClean="0"/>
+              <a:t>test </a:t>
+            </a:r>
+            <a:r>
+              <a:rPr lang="en-GB" sz="1100" dirty="0" smtClean="0"/>
+              <a:t>cases to deem success of system</a:t>
             </a:r>
           </a:p>
           <a:p>

</xml_diff>